<commit_message>
Interim update for chatterbox.
</commit_message>
<xml_diff>
--- a/java/Taskflow/docs/screens.pptx
+++ b/java/Taskflow/docs/screens.pptx
@@ -6,6 +6,9 @@
   </p:sldMasterIdLst>
   <p:sldIdLst>
     <p:sldId id="256" r:id="rId2"/>
+    <p:sldId id="258" r:id="rId3"/>
+    <p:sldId id="257" r:id="rId4"/>
+    <p:sldId id="259" r:id="rId5"/>
   </p:sldIdLst>
   <p:sldSz cx="9144000" cy="6858000" type="screen4x3"/>
   <p:notesSz cx="6858000" cy="9144000"/>
@@ -104,6 +107,11 @@
       </a:defRPr>
     </a:lvl9pPr>
   </p:defaultTextStyle>
+  <p:extLst>
+    <p:ext uri="{EFAFB233-063F-42B5-8137-9DF3F51BA10A}">
+      <p15:sldGuideLst xmlns:p15="http://schemas.microsoft.com/office/powerpoint/2012/main"/>
+    </p:ext>
+  </p:extLst>
 </p:presentation>
 </file>
 
@@ -238,7 +246,7 @@
           <a:p>
             <a:fld id="{10EB0DE4-53A1-451A-8B36-38852520F7FB}" type="datetimeFigureOut">
               <a:rPr lang="en-US" smtClean="0"/>
-              <a:t>10/29/2016</a:t>
+              <a:t>3/19/2017</a:t>
             </a:fld>
             <a:endParaRPr lang="en-US"/>
           </a:p>
@@ -408,7 +416,7 @@
           <a:p>
             <a:fld id="{10EB0DE4-53A1-451A-8B36-38852520F7FB}" type="datetimeFigureOut">
               <a:rPr lang="en-US" smtClean="0"/>
-              <a:t>10/29/2016</a:t>
+              <a:t>3/19/2017</a:t>
             </a:fld>
             <a:endParaRPr lang="en-US"/>
           </a:p>
@@ -588,7 +596,7 @@
           <a:p>
             <a:fld id="{10EB0DE4-53A1-451A-8B36-38852520F7FB}" type="datetimeFigureOut">
               <a:rPr lang="en-US" smtClean="0"/>
-              <a:t>10/29/2016</a:t>
+              <a:t>3/19/2017</a:t>
             </a:fld>
             <a:endParaRPr lang="en-US"/>
           </a:p>
@@ -758,7 +766,7 @@
           <a:p>
             <a:fld id="{10EB0DE4-53A1-451A-8B36-38852520F7FB}" type="datetimeFigureOut">
               <a:rPr lang="en-US" smtClean="0"/>
-              <a:t>10/29/2016</a:t>
+              <a:t>3/19/2017</a:t>
             </a:fld>
             <a:endParaRPr lang="en-US"/>
           </a:p>
@@ -1002,7 +1010,7 @@
           <a:p>
             <a:fld id="{10EB0DE4-53A1-451A-8B36-38852520F7FB}" type="datetimeFigureOut">
               <a:rPr lang="en-US" smtClean="0"/>
-              <a:t>10/29/2016</a:t>
+              <a:t>3/19/2017</a:t>
             </a:fld>
             <a:endParaRPr lang="en-US"/>
           </a:p>
@@ -1234,7 +1242,7 @@
           <a:p>
             <a:fld id="{10EB0DE4-53A1-451A-8B36-38852520F7FB}" type="datetimeFigureOut">
               <a:rPr lang="en-US" smtClean="0"/>
-              <a:t>10/29/2016</a:t>
+              <a:t>3/19/2017</a:t>
             </a:fld>
             <a:endParaRPr lang="en-US"/>
           </a:p>
@@ -1601,7 +1609,7 @@
           <a:p>
             <a:fld id="{10EB0DE4-53A1-451A-8B36-38852520F7FB}" type="datetimeFigureOut">
               <a:rPr lang="en-US" smtClean="0"/>
-              <a:t>10/29/2016</a:t>
+              <a:t>3/19/2017</a:t>
             </a:fld>
             <a:endParaRPr lang="en-US"/>
           </a:p>
@@ -1689,10 +1697,19 @@
             <p:ph type="title"/>
           </p:nvPr>
         </p:nvSpPr>
-        <p:spPr/>
-        <p:txBody>
-          <a:bodyPr/>
-          <a:lstStyle/>
+        <p:spPr>
+          <a:xfrm>
+            <a:off x="628650" y="117476"/>
+            <a:ext cx="7886700" cy="634999"/>
+          </a:xfrm>
+        </p:spPr>
+        <p:txBody>
+          <a:bodyPr/>
+          <a:lstStyle>
+            <a:lvl1pPr algn="ctr">
+              <a:defRPr/>
+            </a:lvl1pPr>
+          </a:lstStyle>
           <a:p>
             <a:r>
               <a:rPr lang="en-US"/>
@@ -1719,7 +1736,7 @@
           <a:p>
             <a:fld id="{10EB0DE4-53A1-451A-8B36-38852520F7FB}" type="datetimeFigureOut">
               <a:rPr lang="en-US" smtClean="0"/>
-              <a:t>10/29/2016</a:t>
+              <a:t>3/19/2017</a:t>
             </a:fld>
             <a:endParaRPr lang="en-US"/>
           </a:p>
@@ -1814,7 +1831,7 @@
           <a:p>
             <a:fld id="{10EB0DE4-53A1-451A-8B36-38852520F7FB}" type="datetimeFigureOut">
               <a:rPr lang="en-US" smtClean="0"/>
-              <a:t>10/29/2016</a:t>
+              <a:t>3/19/2017</a:t>
             </a:fld>
             <a:endParaRPr lang="en-US"/>
           </a:p>
@@ -2091,7 +2108,7 @@
           <a:p>
             <a:fld id="{10EB0DE4-53A1-451A-8B36-38852520F7FB}" type="datetimeFigureOut">
               <a:rPr lang="en-US" smtClean="0"/>
-              <a:t>10/29/2016</a:t>
+              <a:t>3/19/2017</a:t>
             </a:fld>
             <a:endParaRPr lang="en-US"/>
           </a:p>
@@ -2348,7 +2365,7 @@
           <a:p>
             <a:fld id="{10EB0DE4-53A1-451A-8B36-38852520F7FB}" type="datetimeFigureOut">
               <a:rPr lang="en-US" smtClean="0"/>
-              <a:t>10/29/2016</a:t>
+              <a:t>3/19/2017</a:t>
             </a:fld>
             <a:endParaRPr lang="en-US"/>
           </a:p>
@@ -2561,7 +2578,7 @@
           <a:p>
             <a:fld id="{10EB0DE4-53A1-451A-8B36-38852520F7FB}" type="datetimeFigureOut">
               <a:rPr lang="en-US" smtClean="0"/>
-              <a:t>10/29/2016</a:t>
+              <a:t>3/19/2017</a:t>
             </a:fld>
             <a:endParaRPr lang="en-US"/>
           </a:p>
@@ -2968,161 +2985,57 @@
       </p:grpSpPr>
       <p:sp>
         <p:nvSpPr>
-          <p:cNvPr id="4" name="Rectangle 3"/>
-          <p:cNvSpPr/>
-          <p:nvPr/>
+          <p:cNvPr id="21" name="Title 20"/>
+          <p:cNvSpPr>
+            <a:spLocks noGrp="1"/>
+          </p:cNvSpPr>
+          <p:nvPr>
+            <p:ph type="title"/>
+          </p:nvPr>
         </p:nvSpPr>
         <p:spPr>
           <a:xfrm>
-            <a:off x="989901" y="1359017"/>
-            <a:ext cx="2172749" cy="4370664"/>
+            <a:off x="628650" y="117476"/>
+            <a:ext cx="7886700" cy="634999"/>
           </a:xfrm>
-          <a:prstGeom prst="rect">
-            <a:avLst/>
-          </a:prstGeom>
         </p:spPr>
-        <p:style>
-          <a:lnRef idx="2">
-            <a:schemeClr val="accent3"/>
-          </a:lnRef>
-          <a:fillRef idx="1">
-            <a:schemeClr val="lt1"/>
-          </a:fillRef>
-          <a:effectRef idx="0">
-            <a:schemeClr val="accent3"/>
-          </a:effectRef>
-          <a:fontRef idx="minor">
-            <a:schemeClr val="dk1"/>
-          </a:fontRef>
-        </p:style>
-        <p:txBody>
-          <a:bodyPr rtlCol="0" anchor="t" anchorCtr="0"/>
-          <a:lstStyle/>
-          <a:p>
-            <a:pPr marL="285750" indent="-285750">
-              <a:buFontTx/>
-              <a:buChar char="-"/>
-            </a:pPr>
+        <p:txBody>
+          <a:bodyPr>
+            <a:normAutofit fontScale="90000"/>
+          </a:bodyPr>
+          <a:lstStyle/>
+          <a:p>
             <a:r>
               <a:rPr lang="en-US" dirty="0"/>
-              <a:t>Project 1</a:t>
-            </a:r>
-          </a:p>
-          <a:p>
-            <a:pPr marL="630238" lvl="1" indent="-285750">
-              <a:buFontTx/>
-              <a:buChar char="-"/>
-            </a:pPr>
-            <a:r>
-              <a:rPr lang="en-US" dirty="0"/>
-              <a:t>Task A</a:t>
-            </a:r>
-          </a:p>
-          <a:p>
-            <a:pPr marL="974725" lvl="2" indent="-285750">
-              <a:buFontTx/>
-              <a:buChar char="-"/>
-            </a:pPr>
-            <a:r>
-              <a:rPr lang="en-US" sz="1400" dirty="0"/>
-              <a:t>Work Item 1</a:t>
-            </a:r>
-          </a:p>
-          <a:p>
-            <a:pPr marL="974725" lvl="2" indent="-285750">
-              <a:buFontTx/>
-              <a:buChar char="-"/>
-            </a:pPr>
-            <a:r>
-              <a:rPr lang="en-US" sz="1400" dirty="0"/>
-              <a:t>Work Item 2</a:t>
-            </a:r>
-          </a:p>
-          <a:p>
-            <a:pPr marL="974725" lvl="2" indent="-285750">
-              <a:buFontTx/>
-              <a:buChar char="-"/>
-            </a:pPr>
-            <a:r>
-              <a:rPr lang="en-US" sz="1400" dirty="0"/>
-              <a:t>Subtask a</a:t>
-            </a:r>
-          </a:p>
-          <a:p>
-            <a:pPr marL="1311275" lvl="3" indent="-285750">
-              <a:buFontTx/>
-              <a:buChar char="-"/>
-            </a:pPr>
-            <a:r>
-              <a:rPr lang="en-US" sz="1400" dirty="0"/>
-              <a:t>WI 3</a:t>
-            </a:r>
-            <a:endParaRPr lang="en-US" dirty="0"/>
-          </a:p>
-        </p:txBody>
-      </p:sp>
-      <p:sp>
-        <p:nvSpPr>
-          <p:cNvPr id="5" name="Rectangle 4"/>
-          <p:cNvSpPr/>
-          <p:nvPr/>
-        </p:nvSpPr>
-        <p:spPr>
-          <a:xfrm>
-            <a:off x="3162650" y="1359017"/>
-            <a:ext cx="201335" cy="4370664"/>
-          </a:xfrm>
-          <a:prstGeom prst="rect">
-            <a:avLst/>
-          </a:prstGeom>
-        </p:spPr>
-        <p:style>
-          <a:lnRef idx="2">
-            <a:schemeClr val="accent3"/>
-          </a:lnRef>
-          <a:fillRef idx="1">
-            <a:schemeClr val="lt1"/>
-          </a:fillRef>
-          <a:effectRef idx="0">
-            <a:schemeClr val="accent3"/>
-          </a:effectRef>
-          <a:fontRef idx="minor">
-            <a:schemeClr val="dk1"/>
-          </a:fontRef>
-        </p:style>
-        <p:txBody>
-          <a:bodyPr rtlCol="0" anchor="ctr"/>
-          <a:lstStyle/>
-          <a:p>
-            <a:pPr algn="ctr"/>
-            <a:endParaRPr lang="en-US"/>
+              <a:t>Main View</a:t>
+            </a:r>
           </a:p>
         </p:txBody>
       </p:sp>
       <p:grpSp>
         <p:nvGrpSpPr>
-          <p:cNvPr id="15" name="Group 14"/>
+          <p:cNvPr id="29" name="Group 28"/>
           <p:cNvGrpSpPr/>
           <p:nvPr/>
         </p:nvGrpSpPr>
         <p:grpSpPr>
           <a:xfrm>
-            <a:off x="3161667" y="1360001"/>
-            <a:ext cx="202318" cy="177567"/>
-            <a:chOff x="3161667" y="1360001"/>
-            <a:chExt cx="202318" cy="177567"/>
+            <a:off x="1295400" y="1186846"/>
+            <a:ext cx="6553200" cy="5219700"/>
+            <a:chOff x="885826" y="876300"/>
+            <a:chExt cx="6553200" cy="5219700"/>
           </a:xfrm>
         </p:grpSpPr>
         <p:sp>
           <p:nvSpPr>
-            <p:cNvPr id="7" name="Rectangle 6"/>
+            <p:cNvPr id="22" name="Rectangle 21"/>
             <p:cNvSpPr/>
             <p:nvPr/>
           </p:nvSpPr>
           <p:spPr>
             <a:xfrm>
-              <a:off x="3161667" y="1360001"/>
-              <a:ext cx="202318" cy="177567"/>
+              <a:off x="885826" y="876300"/>
+              <a:ext cx="6553200" cy="5219700"/>
             </a:xfrm>
             <a:prstGeom prst="rect">
               <a:avLst/>
@@ -3153,16 +3066,346 @@
         </p:sp>
         <p:sp>
           <p:nvSpPr>
-            <p:cNvPr id="8" name="Isosceles Triangle 7"/>
+            <p:cNvPr id="4" name="Rectangle 3"/>
             <p:cNvSpPr/>
             <p:nvPr/>
           </p:nvSpPr>
           <p:spPr>
             <a:xfrm>
-              <a:off x="3211893" y="1425924"/>
-              <a:ext cx="101866" cy="45719"/>
+              <a:off x="989901" y="1359017"/>
+              <a:ext cx="2172749" cy="4370664"/>
             </a:xfrm>
-            <a:prstGeom prst="triangle">
+            <a:prstGeom prst="rect">
+              <a:avLst/>
+            </a:prstGeom>
+          </p:spPr>
+          <p:style>
+            <a:lnRef idx="2">
+              <a:schemeClr val="accent3"/>
+            </a:lnRef>
+            <a:fillRef idx="1">
+              <a:schemeClr val="lt1"/>
+            </a:fillRef>
+            <a:effectRef idx="0">
+              <a:schemeClr val="accent3"/>
+            </a:effectRef>
+            <a:fontRef idx="minor">
+              <a:schemeClr val="dk1"/>
+            </a:fontRef>
+          </p:style>
+          <p:txBody>
+            <a:bodyPr rtlCol="0" anchor="t" anchorCtr="0"/>
+            <a:lstStyle/>
+            <a:p>
+              <a:pPr marL="285750" indent="-285750">
+                <a:buFontTx/>
+                <a:buChar char="-"/>
+              </a:pPr>
+              <a:r>
+                <a:rPr lang="en-US" dirty="0"/>
+                <a:t>Project 1</a:t>
+              </a:r>
+            </a:p>
+            <a:p>
+              <a:pPr marL="630238" lvl="1" indent="-285750">
+                <a:buFontTx/>
+                <a:buChar char="-"/>
+              </a:pPr>
+              <a:r>
+                <a:rPr lang="en-US" dirty="0"/>
+                <a:t>Task A</a:t>
+              </a:r>
+            </a:p>
+            <a:p>
+              <a:pPr marL="974725" lvl="2" indent="-285750">
+                <a:buFontTx/>
+                <a:buChar char="-"/>
+              </a:pPr>
+              <a:r>
+                <a:rPr lang="en-US" sz="1400" dirty="0"/>
+                <a:t>Work Item 1</a:t>
+              </a:r>
+            </a:p>
+            <a:p>
+              <a:pPr marL="974725" lvl="2" indent="-285750">
+                <a:buFontTx/>
+                <a:buChar char="-"/>
+              </a:pPr>
+              <a:r>
+                <a:rPr lang="en-US" sz="1400" dirty="0"/>
+                <a:t>Work Item 2</a:t>
+              </a:r>
+            </a:p>
+            <a:p>
+              <a:pPr marL="974725" lvl="2" indent="-285750">
+                <a:buFontTx/>
+                <a:buChar char="-"/>
+              </a:pPr>
+              <a:r>
+                <a:rPr lang="en-US" sz="1400" dirty="0"/>
+                <a:t>Subtask a</a:t>
+              </a:r>
+            </a:p>
+            <a:p>
+              <a:pPr marL="1311275" lvl="3" indent="-285750">
+                <a:buFontTx/>
+                <a:buChar char="-"/>
+              </a:pPr>
+              <a:r>
+                <a:rPr lang="en-US" sz="1400" dirty="0"/>
+                <a:t>WI 3</a:t>
+              </a:r>
+              <a:endParaRPr lang="en-US" dirty="0"/>
+            </a:p>
+          </p:txBody>
+        </p:sp>
+        <p:sp>
+          <p:nvSpPr>
+            <p:cNvPr id="5" name="Rectangle 4"/>
+            <p:cNvSpPr/>
+            <p:nvPr/>
+          </p:nvSpPr>
+          <p:spPr>
+            <a:xfrm>
+              <a:off x="3162650" y="1359017"/>
+              <a:ext cx="201335" cy="4370664"/>
+            </a:xfrm>
+            <a:prstGeom prst="rect">
+              <a:avLst/>
+            </a:prstGeom>
+          </p:spPr>
+          <p:style>
+            <a:lnRef idx="2">
+              <a:schemeClr val="accent3"/>
+            </a:lnRef>
+            <a:fillRef idx="1">
+              <a:schemeClr val="lt1"/>
+            </a:fillRef>
+            <a:effectRef idx="0">
+              <a:schemeClr val="accent3"/>
+            </a:effectRef>
+            <a:fontRef idx="minor">
+              <a:schemeClr val="dk1"/>
+            </a:fontRef>
+          </p:style>
+          <p:txBody>
+            <a:bodyPr rtlCol="0" anchor="ctr"/>
+            <a:lstStyle/>
+            <a:p>
+              <a:pPr algn="ctr"/>
+              <a:endParaRPr lang="en-US"/>
+            </a:p>
+          </p:txBody>
+        </p:sp>
+        <p:grpSp>
+          <p:nvGrpSpPr>
+            <p:cNvPr id="15" name="Group 14"/>
+            <p:cNvGrpSpPr/>
+            <p:nvPr/>
+          </p:nvGrpSpPr>
+          <p:grpSpPr>
+            <a:xfrm>
+              <a:off x="3161667" y="1360001"/>
+              <a:ext cx="202318" cy="177567"/>
+              <a:chOff x="3161667" y="1360001"/>
+              <a:chExt cx="202318" cy="177567"/>
+            </a:xfrm>
+          </p:grpSpPr>
+          <p:sp>
+            <p:nvSpPr>
+              <p:cNvPr id="7" name="Rectangle 6"/>
+              <p:cNvSpPr/>
+              <p:nvPr/>
+            </p:nvSpPr>
+            <p:spPr>
+              <a:xfrm>
+                <a:off x="3161667" y="1360001"/>
+                <a:ext cx="202318" cy="177567"/>
+              </a:xfrm>
+              <a:prstGeom prst="rect">
+                <a:avLst/>
+              </a:prstGeom>
+            </p:spPr>
+            <p:style>
+              <a:lnRef idx="2">
+                <a:schemeClr val="accent3"/>
+              </a:lnRef>
+              <a:fillRef idx="1">
+                <a:schemeClr val="lt1"/>
+              </a:fillRef>
+              <a:effectRef idx="0">
+                <a:schemeClr val="accent3"/>
+              </a:effectRef>
+              <a:fontRef idx="minor">
+                <a:schemeClr val="dk1"/>
+              </a:fontRef>
+            </p:style>
+            <p:txBody>
+              <a:bodyPr rtlCol="0" anchor="ctr"/>
+              <a:lstStyle/>
+              <a:p>
+                <a:pPr algn="ctr"/>
+                <a:endParaRPr lang="en-US"/>
+              </a:p>
+            </p:txBody>
+          </p:sp>
+          <p:sp>
+            <p:nvSpPr>
+              <p:cNvPr id="8" name="Isosceles Triangle 7"/>
+              <p:cNvSpPr/>
+              <p:nvPr/>
+            </p:nvSpPr>
+            <p:spPr>
+              <a:xfrm>
+                <a:off x="3211893" y="1425924"/>
+                <a:ext cx="101866" cy="45719"/>
+              </a:xfrm>
+              <a:prstGeom prst="triangle">
+                <a:avLst/>
+              </a:prstGeom>
+              <a:solidFill>
+                <a:schemeClr val="tx1"/>
+              </a:solidFill>
+              <a:ln>
+                <a:solidFill>
+                  <a:schemeClr val="tx1"/>
+                </a:solidFill>
+              </a:ln>
+            </p:spPr>
+            <p:style>
+              <a:lnRef idx="2">
+                <a:schemeClr val="accent1">
+                  <a:shade val="50000"/>
+                </a:schemeClr>
+              </a:lnRef>
+              <a:fillRef idx="1">
+                <a:schemeClr val="accent1"/>
+              </a:fillRef>
+              <a:effectRef idx="0">
+                <a:schemeClr val="accent1"/>
+              </a:effectRef>
+              <a:fontRef idx="minor">
+                <a:schemeClr val="lt1"/>
+              </a:fontRef>
+            </p:style>
+            <p:txBody>
+              <a:bodyPr rtlCol="0" anchor="ctr"/>
+              <a:lstStyle/>
+              <a:p>
+                <a:pPr algn="ctr"/>
+                <a:endParaRPr lang="en-US"/>
+              </a:p>
+            </p:txBody>
+          </p:sp>
+        </p:grpSp>
+        <p:grpSp>
+          <p:nvGrpSpPr>
+            <p:cNvPr id="13" name="Group 12"/>
+            <p:cNvGrpSpPr/>
+            <p:nvPr/>
+          </p:nvGrpSpPr>
+          <p:grpSpPr>
+            <a:xfrm>
+              <a:off x="3164048" y="5548749"/>
+              <a:ext cx="199937" cy="177567"/>
+              <a:chOff x="3164048" y="5548749"/>
+              <a:chExt cx="199937" cy="177567"/>
+            </a:xfrm>
+          </p:grpSpPr>
+          <p:sp>
+            <p:nvSpPr>
+              <p:cNvPr id="6" name="Rectangle 5"/>
+              <p:cNvSpPr/>
+              <p:nvPr/>
+            </p:nvSpPr>
+            <p:spPr>
+              <a:xfrm>
+                <a:off x="3164048" y="5548749"/>
+                <a:ext cx="199937" cy="177567"/>
+              </a:xfrm>
+              <a:prstGeom prst="rect">
+                <a:avLst/>
+              </a:prstGeom>
+            </p:spPr>
+            <p:style>
+              <a:lnRef idx="2">
+                <a:schemeClr val="accent3"/>
+              </a:lnRef>
+              <a:fillRef idx="1">
+                <a:schemeClr val="lt1"/>
+              </a:fillRef>
+              <a:effectRef idx="0">
+                <a:schemeClr val="accent3"/>
+              </a:effectRef>
+              <a:fontRef idx="minor">
+                <a:schemeClr val="dk1"/>
+              </a:fontRef>
+            </p:style>
+            <p:txBody>
+              <a:bodyPr rtlCol="0" anchor="ctr"/>
+              <a:lstStyle/>
+              <a:p>
+                <a:pPr algn="ctr"/>
+                <a:endParaRPr lang="en-US"/>
+              </a:p>
+            </p:txBody>
+          </p:sp>
+          <p:sp>
+            <p:nvSpPr>
+              <p:cNvPr id="9" name="Isosceles Triangle 8"/>
+              <p:cNvSpPr/>
+              <p:nvPr/>
+            </p:nvSpPr>
+            <p:spPr>
+              <a:xfrm rot="10800000">
+                <a:off x="3212984" y="5614672"/>
+                <a:ext cx="100667" cy="45719"/>
+              </a:xfrm>
+              <a:prstGeom prst="triangle">
+                <a:avLst/>
+              </a:prstGeom>
+              <a:solidFill>
+                <a:schemeClr val="tx1"/>
+              </a:solidFill>
+            </p:spPr>
+            <p:style>
+              <a:lnRef idx="2">
+                <a:schemeClr val="accent1">
+                  <a:shade val="50000"/>
+                </a:schemeClr>
+              </a:lnRef>
+              <a:fillRef idx="1">
+                <a:schemeClr val="accent1"/>
+              </a:fillRef>
+              <a:effectRef idx="0">
+                <a:schemeClr val="accent1"/>
+              </a:effectRef>
+              <a:fontRef idx="minor">
+                <a:schemeClr val="lt1"/>
+              </a:fontRef>
+            </p:style>
+            <p:txBody>
+              <a:bodyPr rtlCol="0" anchor="ctr"/>
+              <a:lstStyle/>
+              <a:p>
+                <a:pPr algn="ctr"/>
+                <a:endParaRPr lang="en-US"/>
+              </a:p>
+            </p:txBody>
+          </p:sp>
+        </p:grpSp>
+        <p:sp>
+          <p:nvSpPr>
+            <p:cNvPr id="10" name="Rectangle: Rounded Corners 9"/>
+            <p:cNvSpPr/>
+            <p:nvPr/>
+          </p:nvSpPr>
+          <p:spPr>
+            <a:xfrm>
+              <a:off x="3162650" y="2265028"/>
+              <a:ext cx="201335" cy="276836"/>
+            </a:xfrm>
+            <a:prstGeom prst="roundRect">
               <a:avLst/>
             </a:prstGeom>
           </p:spPr>
@@ -3191,31 +3434,112 @@
             </a:p>
           </p:txBody>
         </p:sp>
-      </p:grpSp>
-      <p:grpSp>
-        <p:nvGrpSpPr>
-          <p:cNvPr id="13" name="Group 12"/>
-          <p:cNvGrpSpPr/>
-          <p:nvPr/>
-        </p:nvGrpSpPr>
-        <p:grpSpPr>
-          <a:xfrm>
-            <a:off x="3164048" y="5548749"/>
-            <a:ext cx="199937" cy="177567"/>
-            <a:chOff x="3164048" y="5548749"/>
-            <a:chExt cx="199937" cy="177567"/>
-          </a:xfrm>
-        </p:grpSpPr>
         <p:sp>
           <p:nvSpPr>
-            <p:cNvPr id="6" name="Rectangle 5"/>
+            <p:cNvPr id="12" name="Trapezoid 11"/>
+            <p:cNvSpPr/>
+            <p:nvPr/>
+          </p:nvSpPr>
+          <p:spPr>
+            <a:xfrm rot="10800000">
+              <a:off x="1659880" y="5730698"/>
+              <a:ext cx="833153" cy="273685"/>
+            </a:xfrm>
+            <a:prstGeom prst="trapezoid">
+              <a:avLst/>
+            </a:prstGeom>
+          </p:spPr>
+          <p:style>
+            <a:lnRef idx="2">
+              <a:schemeClr val="accent3"/>
+            </a:lnRef>
+            <a:fillRef idx="1">
+              <a:schemeClr val="lt1"/>
+            </a:fillRef>
+            <a:effectRef idx="0">
+              <a:schemeClr val="accent3"/>
+            </a:effectRef>
+            <a:fontRef idx="minor">
+              <a:schemeClr val="dk1"/>
+            </a:fontRef>
+          </p:style>
+          <p:txBody>
+            <a:bodyPr rtlCol="0" anchor="ctr">
+              <a:scene3d>
+                <a:camera prst="orthographicFront">
+                  <a:rot lat="0" lon="0" rev="10800000"/>
+                </a:camera>
+                <a:lightRig rig="threePt" dir="t"/>
+              </a:scene3d>
+            </a:bodyPr>
+            <a:lstStyle/>
+            <a:p>
+              <a:pPr algn="ctr"/>
+              <a:r>
+                <a:rPr lang="en-US" dirty="0"/>
+                <a:t>Table</a:t>
+              </a:r>
+            </a:p>
+          </p:txBody>
+        </p:sp>
+        <p:sp>
+          <p:nvSpPr>
+            <p:cNvPr id="11" name="Trapezoid 10"/>
+            <p:cNvSpPr/>
+            <p:nvPr/>
+          </p:nvSpPr>
+          <p:spPr>
+            <a:xfrm rot="10800000">
+              <a:off x="989901" y="5729703"/>
+              <a:ext cx="733245" cy="273685"/>
+            </a:xfrm>
+            <a:prstGeom prst="trapezoid">
+              <a:avLst/>
+            </a:prstGeom>
+          </p:spPr>
+          <p:style>
+            <a:lnRef idx="2">
+              <a:schemeClr val="accent3"/>
+            </a:lnRef>
+            <a:fillRef idx="1">
+              <a:schemeClr val="lt1"/>
+            </a:fillRef>
+            <a:effectRef idx="0">
+              <a:schemeClr val="accent3"/>
+            </a:effectRef>
+            <a:fontRef idx="minor">
+              <a:schemeClr val="dk1"/>
+            </a:fontRef>
+          </p:style>
+          <p:txBody>
+            <a:bodyPr rtlCol="0" anchor="ctr">
+              <a:scene3d>
+                <a:camera prst="orthographicFront">
+                  <a:rot lat="0" lon="0" rev="10800000"/>
+                </a:camera>
+                <a:lightRig rig="threePt" dir="t"/>
+              </a:scene3d>
+            </a:bodyPr>
+            <a:lstStyle/>
+            <a:p>
+              <a:pPr algn="ctr"/>
+              <a:r>
+                <a:rPr lang="en-US" dirty="0"/>
+                <a:t>Tree</a:t>
+              </a:r>
+            </a:p>
+          </p:txBody>
+        </p:sp>
+        <p:sp>
+          <p:nvSpPr>
+            <p:cNvPr id="16" name="Rectangle 15"/>
             <p:cNvSpPr/>
             <p:nvPr/>
           </p:nvSpPr>
           <p:spPr>
             <a:xfrm>
-              <a:off x="3164048" y="5548749"/>
-              <a:ext cx="199937" cy="177567"/>
+              <a:off x="3493698" y="974785"/>
+              <a:ext cx="3821502" cy="4751531"/>
             </a:xfrm>
             <a:prstGeom prst="rect">
               <a:avLst/>
@@ -3244,225 +3568,491 @@
             </a:p>
           </p:txBody>
         </p:sp>
-        <p:sp>
-          <p:nvSpPr>
-            <p:cNvPr id="9" name="Isosceles Triangle 8"/>
-            <p:cNvSpPr/>
+        <p:grpSp>
+          <p:nvGrpSpPr>
+            <p:cNvPr id="17" name="Group 16"/>
+            <p:cNvGrpSpPr/>
             <p:nvPr/>
-          </p:nvSpPr>
+          </p:nvGrpSpPr>
+          <p:grpSpPr>
+            <a:xfrm>
+              <a:off x="1095555" y="974785"/>
+              <a:ext cx="345056" cy="315221"/>
+              <a:chOff x="1095555" y="974785"/>
+              <a:chExt cx="345056" cy="315221"/>
+            </a:xfrm>
+          </p:grpSpPr>
+          <p:sp>
+            <p:nvSpPr>
+              <p:cNvPr id="2" name="Rectangle: Rounded Corners 1"/>
+              <p:cNvSpPr/>
+              <p:nvPr/>
+            </p:nvSpPr>
+            <p:spPr>
+              <a:xfrm>
+                <a:off x="1095555" y="974785"/>
+                <a:ext cx="345056" cy="315221"/>
+              </a:xfrm>
+              <a:prstGeom prst="roundRect">
+                <a:avLst>
+                  <a:gd name="adj" fmla="val 13444"/>
+                </a:avLst>
+              </a:prstGeom>
+              <a:solidFill>
+                <a:schemeClr val="bg1"/>
+              </a:solidFill>
+            </p:spPr>
+            <p:style>
+              <a:lnRef idx="2">
+                <a:schemeClr val="accent1">
+                  <a:shade val="50000"/>
+                </a:schemeClr>
+              </a:lnRef>
+              <a:fillRef idx="1">
+                <a:schemeClr val="accent1"/>
+              </a:fillRef>
+              <a:effectRef idx="0">
+                <a:schemeClr val="accent1"/>
+              </a:effectRef>
+              <a:fontRef idx="minor">
+                <a:schemeClr val="lt1"/>
+              </a:fontRef>
+            </p:style>
+            <p:txBody>
+              <a:bodyPr rtlCol="0" anchor="ctr"/>
+              <a:lstStyle/>
+              <a:p>
+                <a:pPr algn="ctr"/>
+                <a:endParaRPr lang="en-US" dirty="0"/>
+              </a:p>
+            </p:txBody>
+          </p:sp>
+          <p:pic>
+            <p:nvPicPr>
+              <p:cNvPr id="14" name="Picture 13"/>
+              <p:cNvPicPr>
+                <a:picLocks noChangeAspect="1"/>
+              </p:cNvPicPr>
+              <p:nvPr/>
+            </p:nvPicPr>
+            <p:blipFill>
+              <a:blip r:embed="rId2">
+                <a:extLst>
+                  <a:ext uri="{28A0092B-C50C-407E-A947-70E740481C1C}">
+                    <a14:useLocalDpi xmlns:a14="http://schemas.microsoft.com/office/drawing/2010/main" val="0"/>
+                  </a:ext>
+                </a:extLst>
+              </a:blip>
+              <a:stretch>
+                <a:fillRect/>
+              </a:stretch>
+            </p:blipFill>
+            <p:spPr>
+              <a:xfrm>
+                <a:off x="1166495" y="1033045"/>
+                <a:ext cx="203175" cy="203175"/>
+              </a:xfrm>
+              <a:prstGeom prst="rect">
+                <a:avLst/>
+              </a:prstGeom>
+            </p:spPr>
+          </p:pic>
+        </p:grpSp>
+        <p:grpSp>
+          <p:nvGrpSpPr>
+            <p:cNvPr id="20" name="Group 19"/>
+            <p:cNvGrpSpPr/>
+            <p:nvPr/>
+          </p:nvGrpSpPr>
+          <p:grpSpPr>
+            <a:xfrm>
+              <a:off x="1451021" y="974785"/>
+              <a:ext cx="138024" cy="315221"/>
+              <a:chOff x="1440610" y="973768"/>
+              <a:chExt cx="138024" cy="315221"/>
+            </a:xfrm>
+          </p:grpSpPr>
+          <p:sp>
+            <p:nvSpPr>
+              <p:cNvPr id="18" name="Rectangle: Rounded Corners 17"/>
+              <p:cNvSpPr/>
+              <p:nvPr/>
+            </p:nvSpPr>
+            <p:spPr>
+              <a:xfrm>
+                <a:off x="1440610" y="973768"/>
+                <a:ext cx="138024" cy="315221"/>
+              </a:xfrm>
+              <a:prstGeom prst="roundRect">
+                <a:avLst>
+                  <a:gd name="adj" fmla="val 27708"/>
+                </a:avLst>
+              </a:prstGeom>
+              <a:solidFill>
+                <a:schemeClr val="bg1"/>
+              </a:solidFill>
+            </p:spPr>
+            <p:style>
+              <a:lnRef idx="2">
+                <a:schemeClr val="accent1">
+                  <a:shade val="50000"/>
+                </a:schemeClr>
+              </a:lnRef>
+              <a:fillRef idx="1">
+                <a:schemeClr val="accent1"/>
+              </a:fillRef>
+              <a:effectRef idx="0">
+                <a:schemeClr val="accent1"/>
+              </a:effectRef>
+              <a:fontRef idx="minor">
+                <a:schemeClr val="lt1"/>
+              </a:fontRef>
+            </p:style>
+            <p:txBody>
+              <a:bodyPr rtlCol="0" anchor="ctr"/>
+              <a:lstStyle/>
+              <a:p>
+                <a:pPr algn="ctr"/>
+                <a:endParaRPr lang="en-US" dirty="0"/>
+              </a:p>
+            </p:txBody>
+          </p:sp>
+          <p:sp>
+            <p:nvSpPr>
+              <p:cNvPr id="19" name="Isosceles Triangle 18"/>
+              <p:cNvSpPr/>
+              <p:nvPr/>
+            </p:nvSpPr>
+            <p:spPr>
+              <a:xfrm rot="10800000">
+                <a:off x="1486763" y="1105499"/>
+                <a:ext cx="45719" cy="51758"/>
+              </a:xfrm>
+              <a:prstGeom prst="triangle">
+                <a:avLst/>
+              </a:prstGeom>
+              <a:solidFill>
+                <a:schemeClr val="tx1"/>
+              </a:solidFill>
+              <a:ln>
+                <a:solidFill>
+                  <a:schemeClr val="tx1"/>
+                </a:solidFill>
+              </a:ln>
+            </p:spPr>
+            <p:style>
+              <a:lnRef idx="2">
+                <a:schemeClr val="accent1">
+                  <a:shade val="50000"/>
+                </a:schemeClr>
+              </a:lnRef>
+              <a:fillRef idx="1">
+                <a:schemeClr val="accent1"/>
+              </a:fillRef>
+              <a:effectRef idx="0">
+                <a:schemeClr val="accent1"/>
+              </a:effectRef>
+              <a:fontRef idx="minor">
+                <a:schemeClr val="lt1"/>
+              </a:fontRef>
+            </p:style>
+            <p:txBody>
+              <a:bodyPr rtlCol="0" anchor="ctr"/>
+              <a:lstStyle/>
+              <a:p>
+                <a:pPr algn="ctr"/>
+                <a:endParaRPr lang="en-US"/>
+              </a:p>
+            </p:txBody>
+          </p:sp>
+        </p:grpSp>
+        <p:cxnSp>
+          <p:nvCxnSpPr>
+            <p:cNvPr id="24" name="Straight Connector 23"/>
+            <p:cNvCxnSpPr>
+              <a:cxnSpLocks/>
+            </p:cNvCxnSpPr>
+            <p:nvPr/>
+          </p:nvCxnSpPr>
           <p:spPr>
-            <a:xfrm rot="10800000">
-              <a:off x="3212984" y="5614672"/>
-              <a:ext cx="100667" cy="45719"/>
+            <a:xfrm flipV="1">
+              <a:off x="3390354" y="3162409"/>
+              <a:ext cx="68122" cy="1"/>
             </a:xfrm>
-            <a:prstGeom prst="triangle">
+            <a:prstGeom prst="line">
               <a:avLst/>
             </a:prstGeom>
+            <a:ln w="19050">
+              <a:solidFill>
+                <a:schemeClr val="tx1">
+                  <a:lumMod val="50000"/>
+                  <a:lumOff val="50000"/>
+                </a:schemeClr>
+              </a:solidFill>
+            </a:ln>
           </p:spPr>
           <p:style>
-            <a:lnRef idx="2">
-              <a:schemeClr val="accent1">
-                <a:shade val="50000"/>
-              </a:schemeClr>
+            <a:lnRef idx="1">
+              <a:schemeClr val="accent1"/>
             </a:lnRef>
-            <a:fillRef idx="1">
+            <a:fillRef idx="0">
               <a:schemeClr val="accent1"/>
             </a:fillRef>
             <a:effectRef idx="0">
               <a:schemeClr val="accent1"/>
             </a:effectRef>
             <a:fontRef idx="minor">
-              <a:schemeClr val="lt1"/>
+              <a:schemeClr val="tx1"/>
             </a:fontRef>
           </p:style>
-          <p:txBody>
-            <a:bodyPr rtlCol="0" anchor="ctr"/>
-            <a:lstStyle/>
-            <a:p>
-              <a:pPr algn="ctr"/>
-              <a:endParaRPr lang="en-US"/>
-            </a:p>
-          </p:txBody>
-        </p:sp>
+        </p:cxnSp>
+        <p:cxnSp>
+          <p:nvCxnSpPr>
+            <p:cNvPr id="27" name="Straight Connector 26"/>
+            <p:cNvCxnSpPr>
+              <a:cxnSpLocks/>
+            </p:cNvCxnSpPr>
+            <p:nvPr/>
+          </p:nvCxnSpPr>
+          <p:spPr>
+            <a:xfrm flipV="1">
+              <a:off x="3390354" y="3230968"/>
+              <a:ext cx="68122" cy="1"/>
+            </a:xfrm>
+            <a:prstGeom prst="line">
+              <a:avLst/>
+            </a:prstGeom>
+            <a:ln w="19050">
+              <a:solidFill>
+                <a:schemeClr val="tx1">
+                  <a:lumMod val="50000"/>
+                  <a:lumOff val="50000"/>
+                </a:schemeClr>
+              </a:solidFill>
+            </a:ln>
+          </p:spPr>
+          <p:style>
+            <a:lnRef idx="1">
+              <a:schemeClr val="accent1"/>
+            </a:lnRef>
+            <a:fillRef idx="0">
+              <a:schemeClr val="accent1"/>
+            </a:fillRef>
+            <a:effectRef idx="0">
+              <a:schemeClr val="accent1"/>
+            </a:effectRef>
+            <a:fontRef idx="minor">
+              <a:schemeClr val="tx1"/>
+            </a:fontRef>
+          </p:style>
+        </p:cxnSp>
+        <p:cxnSp>
+          <p:nvCxnSpPr>
+            <p:cNvPr id="28" name="Straight Connector 27"/>
+            <p:cNvCxnSpPr>
+              <a:cxnSpLocks/>
+            </p:cNvCxnSpPr>
+            <p:nvPr/>
+          </p:nvCxnSpPr>
+          <p:spPr>
+            <a:xfrm flipV="1">
+              <a:off x="3390354" y="3294967"/>
+              <a:ext cx="68122" cy="1"/>
+            </a:xfrm>
+            <a:prstGeom prst="line">
+              <a:avLst/>
+            </a:prstGeom>
+            <a:ln w="19050">
+              <a:solidFill>
+                <a:schemeClr val="tx1">
+                  <a:lumMod val="50000"/>
+                  <a:lumOff val="50000"/>
+                </a:schemeClr>
+              </a:solidFill>
+            </a:ln>
+          </p:spPr>
+          <p:style>
+            <a:lnRef idx="1">
+              <a:schemeClr val="accent1"/>
+            </a:lnRef>
+            <a:fillRef idx="0">
+              <a:schemeClr val="accent1"/>
+            </a:fillRef>
+            <a:effectRef idx="0">
+              <a:schemeClr val="accent1"/>
+            </a:effectRef>
+            <a:fontRef idx="minor">
+              <a:schemeClr val="tx1"/>
+            </a:fontRef>
+          </p:style>
+        </p:cxnSp>
       </p:grpSp>
-      <p:sp>
-        <p:nvSpPr>
-          <p:cNvPr id="10" name="Rectangle: Rounded Corners 9"/>
-          <p:cNvSpPr/>
-          <p:nvPr/>
-        </p:nvSpPr>
-        <p:spPr>
-          <a:xfrm>
-            <a:off x="3162650" y="2265028"/>
-            <a:ext cx="201335" cy="276836"/>
-          </a:xfrm>
-          <a:prstGeom prst="roundRect">
-            <a:avLst/>
-          </a:prstGeom>
-        </p:spPr>
-        <p:style>
-          <a:lnRef idx="2">
-            <a:schemeClr val="accent1">
-              <a:shade val="50000"/>
-            </a:schemeClr>
-          </a:lnRef>
-          <a:fillRef idx="1">
-            <a:schemeClr val="accent1"/>
-          </a:fillRef>
-          <a:effectRef idx="0">
-            <a:schemeClr val="accent1"/>
-          </a:effectRef>
-          <a:fontRef idx="minor">
-            <a:schemeClr val="lt1"/>
-          </a:fontRef>
-        </p:style>
-        <p:txBody>
-          <a:bodyPr rtlCol="0" anchor="ctr"/>
-          <a:lstStyle/>
-          <a:p>
-            <a:pPr algn="ctr"/>
-            <a:endParaRPr lang="en-US"/>
-          </a:p>
-        </p:txBody>
-      </p:sp>
-      <p:sp>
-        <p:nvSpPr>
-          <p:cNvPr id="12" name="Trapezoid 11"/>
-          <p:cNvSpPr/>
-          <p:nvPr/>
-        </p:nvSpPr>
-        <p:spPr>
-          <a:xfrm rot="10800000">
-            <a:off x="1659880" y="5730698"/>
-            <a:ext cx="833153" cy="273685"/>
-          </a:xfrm>
-          <a:prstGeom prst="trapezoid">
-            <a:avLst/>
-          </a:prstGeom>
-        </p:spPr>
-        <p:style>
-          <a:lnRef idx="2">
-            <a:schemeClr val="accent3"/>
-          </a:lnRef>
-          <a:fillRef idx="1">
-            <a:schemeClr val="lt1"/>
-          </a:fillRef>
-          <a:effectRef idx="0">
-            <a:schemeClr val="accent3"/>
-          </a:effectRef>
-          <a:fontRef idx="minor">
-            <a:schemeClr val="dk1"/>
-          </a:fontRef>
-        </p:style>
-        <p:txBody>
-          <a:bodyPr rtlCol="0" anchor="ctr">
-            <a:scene3d>
-              <a:camera prst="orthographicFront">
-                <a:rot lat="0" lon="0" rev="10800000"/>
-              </a:camera>
-              <a:lightRig rig="threePt" dir="t"/>
-            </a:scene3d>
-          </a:bodyPr>
-          <a:lstStyle/>
-          <a:p>
-            <a:pPr algn="ctr"/>
-            <a:r>
-              <a:rPr lang="en-US" dirty="0"/>
-              <a:t>Table</a:t>
-            </a:r>
-          </a:p>
-        </p:txBody>
-      </p:sp>
-      <p:sp>
-        <p:nvSpPr>
-          <p:cNvPr id="11" name="Trapezoid 10"/>
-          <p:cNvSpPr/>
-          <p:nvPr/>
-        </p:nvSpPr>
-        <p:spPr>
-          <a:xfrm rot="10800000">
-            <a:off x="989901" y="5729703"/>
-            <a:ext cx="733245" cy="273685"/>
-          </a:xfrm>
-          <a:prstGeom prst="trapezoid">
-            <a:avLst/>
-          </a:prstGeom>
-        </p:spPr>
-        <p:style>
-          <a:lnRef idx="2">
-            <a:schemeClr val="accent3"/>
-          </a:lnRef>
-          <a:fillRef idx="1">
-            <a:schemeClr val="lt1"/>
-          </a:fillRef>
-          <a:effectRef idx="0">
-            <a:schemeClr val="accent3"/>
-          </a:effectRef>
-          <a:fontRef idx="minor">
-            <a:schemeClr val="dk1"/>
-          </a:fontRef>
-        </p:style>
-        <p:txBody>
-          <a:bodyPr rtlCol="0" anchor="ctr">
-            <a:scene3d>
-              <a:camera prst="orthographicFront">
-                <a:rot lat="0" lon="0" rev="10800000"/>
-              </a:camera>
-              <a:lightRig rig="threePt" dir="t"/>
-            </a:scene3d>
-          </a:bodyPr>
-          <a:lstStyle/>
-          <a:p>
-            <a:pPr algn="ctr"/>
-            <a:r>
-              <a:rPr lang="en-US" dirty="0"/>
-              <a:t>Tree</a:t>
-            </a:r>
-          </a:p>
-        </p:txBody>
-      </p:sp>
-      <p:sp>
-        <p:nvSpPr>
-          <p:cNvPr id="16" name="Rectangle 15"/>
-          <p:cNvSpPr/>
-          <p:nvPr/>
-        </p:nvSpPr>
-        <p:spPr>
-          <a:xfrm>
-            <a:off x="3493698" y="1362974"/>
-            <a:ext cx="3821502" cy="4363342"/>
-          </a:xfrm>
-          <a:prstGeom prst="rect">
-            <a:avLst/>
-          </a:prstGeom>
-        </p:spPr>
-        <p:style>
-          <a:lnRef idx="2">
-            <a:schemeClr val="accent3"/>
-          </a:lnRef>
-          <a:fillRef idx="1">
-            <a:schemeClr val="lt1"/>
-          </a:fillRef>
-          <a:effectRef idx="0">
-            <a:schemeClr val="accent3"/>
-          </a:effectRef>
-          <a:fontRef idx="minor">
-            <a:schemeClr val="dk1"/>
-          </a:fontRef>
-        </p:style>
-        <p:txBody>
-          <a:bodyPr rtlCol="0" anchor="ctr"/>
-          <a:lstStyle/>
-          <a:p>
-            <a:pPr algn="ctr"/>
-            <a:endParaRPr lang="en-US"/>
-          </a:p>
-        </p:txBody>
-      </p:sp>
     </p:spTree>
     <p:extLst>
       <p:ext uri="{BB962C8B-B14F-4D97-AF65-F5344CB8AC3E}">
         <p14:creationId xmlns:p14="http://schemas.microsoft.com/office/powerpoint/2010/main" val="331775858"/>
+      </p:ext>
+    </p:extLst>
+  </p:cSld>
+  <p:clrMapOvr>
+    <a:masterClrMapping/>
+  </p:clrMapOvr>
+</p:sld>
+</file>
+
+<file path=ppt/slides/slide2.xml><?xml version="1.0" encoding="utf-8"?>
+<p:sld xmlns:a="http://schemas.openxmlformats.org/drawingml/2006/main" xmlns:r="http://schemas.openxmlformats.org/officeDocument/2006/relationships" xmlns:p="http://schemas.openxmlformats.org/presentationml/2006/main">
+  <p:cSld>
+    <p:spTree>
+      <p:nvGrpSpPr>
+        <p:cNvPr id="1" name=""/>
+        <p:cNvGrpSpPr/>
+        <p:nvPr/>
+      </p:nvGrpSpPr>
+      <p:grpSpPr>
+        <a:xfrm>
+          <a:off x="0" y="0"/>
+          <a:ext cx="0" cy="0"/>
+          <a:chOff x="0" y="0"/>
+          <a:chExt cx="0" cy="0"/>
+        </a:xfrm>
+      </p:grpSpPr>
+      <p:sp>
+        <p:nvSpPr>
+          <p:cNvPr id="2" name="Title 1"/>
+          <p:cNvSpPr>
+            <a:spLocks noGrp="1"/>
+          </p:cNvSpPr>
+          <p:nvPr>
+            <p:ph type="title"/>
+          </p:nvPr>
+        </p:nvSpPr>
+        <p:spPr/>
+        <p:txBody>
+          <a:bodyPr>
+            <a:normAutofit fontScale="90000"/>
+          </a:bodyPr>
+          <a:lstStyle/>
+          <a:p>
+            <a:r>
+              <a:rPr lang="en-US" dirty="0"/>
+              <a:t>Project View</a:t>
+            </a:r>
+          </a:p>
+        </p:txBody>
+      </p:sp>
+    </p:spTree>
+    <p:extLst>
+      <p:ext uri="{BB962C8B-B14F-4D97-AF65-F5344CB8AC3E}">
+        <p14:creationId xmlns:p14="http://schemas.microsoft.com/office/powerpoint/2010/main" val="2432897860"/>
+      </p:ext>
+    </p:extLst>
+  </p:cSld>
+  <p:clrMapOvr>
+    <a:masterClrMapping/>
+  </p:clrMapOvr>
+</p:sld>
+</file>
+
+<file path=ppt/slides/slide3.xml><?xml version="1.0" encoding="utf-8"?>
+<p:sld xmlns:a="http://schemas.openxmlformats.org/drawingml/2006/main" xmlns:r="http://schemas.openxmlformats.org/officeDocument/2006/relationships" xmlns:p="http://schemas.openxmlformats.org/presentationml/2006/main">
+  <p:cSld>
+    <p:spTree>
+      <p:nvGrpSpPr>
+        <p:cNvPr id="1" name=""/>
+        <p:cNvGrpSpPr/>
+        <p:nvPr/>
+      </p:nvGrpSpPr>
+      <p:grpSpPr>
+        <a:xfrm>
+          <a:off x="0" y="0"/>
+          <a:ext cx="0" cy="0"/>
+          <a:chOff x="0" y="0"/>
+          <a:chExt cx="0" cy="0"/>
+        </a:xfrm>
+      </p:grpSpPr>
+      <p:sp>
+        <p:nvSpPr>
+          <p:cNvPr id="2" name="Title 1"/>
+          <p:cNvSpPr>
+            <a:spLocks noGrp="1"/>
+          </p:cNvSpPr>
+          <p:nvPr>
+            <p:ph type="title"/>
+          </p:nvPr>
+        </p:nvSpPr>
+        <p:spPr/>
+        <p:txBody>
+          <a:bodyPr>
+            <a:normAutofit fontScale="90000"/>
+          </a:bodyPr>
+          <a:lstStyle/>
+          <a:p>
+            <a:r>
+              <a:rPr lang="en-US" dirty="0"/>
+              <a:t>Task View</a:t>
+            </a:r>
+          </a:p>
+        </p:txBody>
+      </p:sp>
+    </p:spTree>
+    <p:extLst>
+      <p:ext uri="{BB962C8B-B14F-4D97-AF65-F5344CB8AC3E}">
+        <p14:creationId xmlns:p14="http://schemas.microsoft.com/office/powerpoint/2010/main" val="332565346"/>
+      </p:ext>
+    </p:extLst>
+  </p:cSld>
+  <p:clrMapOvr>
+    <a:masterClrMapping/>
+  </p:clrMapOvr>
+</p:sld>
+</file>
+
+<file path=ppt/slides/slide4.xml><?xml version="1.0" encoding="utf-8"?>
+<p:sld xmlns:a="http://schemas.openxmlformats.org/drawingml/2006/main" xmlns:r="http://schemas.openxmlformats.org/officeDocument/2006/relationships" xmlns:p="http://schemas.openxmlformats.org/presentationml/2006/main">
+  <p:cSld>
+    <p:spTree>
+      <p:nvGrpSpPr>
+        <p:cNvPr id="1" name=""/>
+        <p:cNvGrpSpPr/>
+        <p:nvPr/>
+      </p:nvGrpSpPr>
+      <p:grpSpPr>
+        <a:xfrm>
+          <a:off x="0" y="0"/>
+          <a:ext cx="0" cy="0"/>
+          <a:chOff x="0" y="0"/>
+          <a:chExt cx="0" cy="0"/>
+        </a:xfrm>
+      </p:grpSpPr>
+      <p:sp>
+        <p:nvSpPr>
+          <p:cNvPr id="2" name="Title 1"/>
+          <p:cNvSpPr>
+            <a:spLocks noGrp="1"/>
+          </p:cNvSpPr>
+          <p:nvPr>
+            <p:ph type="title"/>
+          </p:nvPr>
+        </p:nvSpPr>
+        <p:spPr/>
+        <p:txBody>
+          <a:bodyPr>
+            <a:normAutofit fontScale="90000"/>
+          </a:bodyPr>
+          <a:lstStyle/>
+          <a:p>
+            <a:r>
+              <a:rPr lang="en-US" dirty="0"/>
+              <a:t>Table View</a:t>
+            </a:r>
+          </a:p>
+        </p:txBody>
+      </p:sp>
+    </p:spTree>
+    <p:extLst>
+      <p:ext uri="{BB962C8B-B14F-4D97-AF65-F5344CB8AC3E}">
+        <p14:creationId xmlns:p14="http://schemas.microsoft.com/office/powerpoint/2010/main" val="3637952740"/>
       </p:ext>
     </p:extLst>
   </p:cSld>

</xml_diff>